<commit_message>
minor updates in slides
</commit_message>
<xml_diff>
--- a/Presentation.pptx
+++ b/Presentation.pptx
@@ -208,7 +208,7 @@
             <a:fld id="{0B46E967-D514-4634-ACE6-52F4ED5C9865}" type="datetimeFigureOut">
               <a:rPr lang="en-US" smtClean="0"/>
               <a:pPr/>
-              <a:t>6/6/2024</a:t>
+              <a:t>6/7/2024</a:t>
             </a:fld>
             <a:endParaRPr lang="en-US"/>
           </a:p>
@@ -656,7 +656,7 @@
             <a:fld id="{07658EFF-8520-44EF-8BA4-72016830A387}" type="datetime1">
               <a:rPr lang="en-US" smtClean="0"/>
               <a:pPr/>
-              <a:t>6/6/2024</a:t>
+              <a:t>6/7/2024</a:t>
             </a:fld>
             <a:endParaRPr lang="en-US"/>
           </a:p>
@@ -823,7 +823,7 @@
             <a:fld id="{37A3938E-2D3A-4AAD-81FE-A3D007BC372E}" type="datetime1">
               <a:rPr lang="en-US" smtClean="0"/>
               <a:pPr/>
-              <a:t>6/6/2024</a:t>
+              <a:t>6/7/2024</a:t>
             </a:fld>
             <a:endParaRPr lang="en-US"/>
           </a:p>
@@ -1000,7 +1000,7 @@
             <a:fld id="{7A60BA20-945D-40D1-8BE8-709C84CEFF78}" type="datetime1">
               <a:rPr lang="en-US" smtClean="0"/>
               <a:pPr/>
-              <a:t>6/6/2024</a:t>
+              <a:t>6/7/2024</a:t>
             </a:fld>
             <a:endParaRPr lang="en-US"/>
           </a:p>
@@ -1167,7 +1167,7 @@
             <a:fld id="{6EB41CD9-7575-4E3F-9658-60E431BA4B6E}" type="datetime1">
               <a:rPr lang="en-US" smtClean="0"/>
               <a:pPr/>
-              <a:t>6/6/2024</a:t>
+              <a:t>6/7/2024</a:t>
             </a:fld>
             <a:endParaRPr lang="en-US"/>
           </a:p>
@@ -1410,7 +1410,7 @@
             <a:fld id="{8EDE4D7D-5F33-45F7-A535-EF458CB04025}" type="datetime1">
               <a:rPr lang="en-US" smtClean="0"/>
               <a:pPr/>
-              <a:t>6/6/2024</a:t>
+              <a:t>6/7/2024</a:t>
             </a:fld>
             <a:endParaRPr lang="en-US"/>
           </a:p>
@@ -1695,7 +1695,7 @@
             <a:fld id="{9031839E-8E0F-4F89-9984-9CB0561C2FA9}" type="datetime1">
               <a:rPr lang="en-US" smtClean="0"/>
               <a:pPr/>
-              <a:t>6/6/2024</a:t>
+              <a:t>6/7/2024</a:t>
             </a:fld>
             <a:endParaRPr lang="en-US"/>
           </a:p>
@@ -2114,7 +2114,7 @@
             <a:fld id="{47FC15C1-694E-487D-A1D9-387EE5C02961}" type="datetime1">
               <a:rPr lang="en-US" smtClean="0"/>
               <a:pPr/>
-              <a:t>6/6/2024</a:t>
+              <a:t>6/7/2024</a:t>
             </a:fld>
             <a:endParaRPr lang="en-US"/>
           </a:p>
@@ -2229,7 +2229,7 @@
             <a:fld id="{FCD3DEDB-8D5B-4D50-9A7A-A9D20BF4A8AB}" type="datetime1">
               <a:rPr lang="en-US" smtClean="0"/>
               <a:pPr/>
-              <a:t>6/6/2024</a:t>
+              <a:t>6/7/2024</a:t>
             </a:fld>
             <a:endParaRPr lang="en-US"/>
           </a:p>
@@ -2321,7 +2321,7 @@
             <a:fld id="{4D3AE365-2549-4A84-9861-12A8D4EA9716}" type="datetime1">
               <a:rPr lang="en-US" smtClean="0"/>
               <a:pPr/>
-              <a:t>6/6/2024</a:t>
+              <a:t>6/7/2024</a:t>
             </a:fld>
             <a:endParaRPr lang="en-US"/>
           </a:p>
@@ -2595,7 +2595,7 @@
             <a:fld id="{F5D839D7-D08E-4BD6-BC0D-AE80724D73B3}" type="datetime1">
               <a:rPr lang="en-US" smtClean="0"/>
               <a:pPr/>
-              <a:t>6/6/2024</a:t>
+              <a:t>6/7/2024</a:t>
             </a:fld>
             <a:endParaRPr lang="en-US"/>
           </a:p>
@@ -2845,7 +2845,7 @@
             <a:fld id="{6B493FC4-059E-4D43-8CD5-AA24AD1A521A}" type="datetime1">
               <a:rPr lang="en-US" smtClean="0"/>
               <a:pPr/>
-              <a:t>6/6/2024</a:t>
+              <a:t>6/7/2024</a:t>
             </a:fld>
             <a:endParaRPr lang="en-US"/>
           </a:p>
@@ -3064,7 +3064,7 @@
             <a:fld id="{402B9B8C-A62C-4D5C-933B-4D59DD6614EC}" type="datetime1">
               <a:rPr lang="en-US" smtClean="0"/>
               <a:pPr/>
-              <a:t>6/6/2024</a:t>
+              <a:t>6/7/2024</a:t>
             </a:fld>
             <a:endParaRPr lang="en-US"/>
           </a:p>
@@ -3471,11 +3471,15 @@
             </a:br>
             <a:r>
               <a:rPr lang="en-US" dirty="0"/>
-              <a:t> Document-Management </a:t>
+              <a:t> </a:t>
             </a:r>
             <a:r>
               <a:rPr lang="en-US" dirty="0" smtClean="0"/>
-              <a:t> System</a:t>
+              <a:t>Document Management System</a:t>
+            </a:r>
+            <a:r>
+              <a:rPr lang="en-US" dirty="0" smtClean="0"/>
+              <a:t/>
             </a:r>
             <a:br>
               <a:rPr lang="en-US" dirty="0" smtClean="0"/>
@@ -4056,7 +4060,7 @@
       </p:sp>
       <p:pic>
         <p:nvPicPr>
-          <p:cNvPr id="2052" name="Picture 4"/>
+          <p:cNvPr id="2051" name="Picture 3"/>
           <p:cNvPicPr>
             <a:picLocks noGrp="1" noChangeAspect="1" noChangeArrowheads="1"/>
           </p:cNvPicPr>
@@ -4073,8 +4077,8 @@
         </p:blipFill>
         <p:spPr bwMode="auto">
           <a:xfrm>
-            <a:off x="500034" y="2214554"/>
-            <a:ext cx="8229600" cy="3338636"/>
+            <a:off x="457200" y="2071678"/>
+            <a:ext cx="8329642" cy="3929089"/>
           </a:xfrm>
           <a:prstGeom prst="rect">
             <a:avLst/>
@@ -4591,7 +4595,15 @@
             </a:r>
             <a:r>
               <a:rPr lang="en-CA" sz="2000" dirty="0" smtClean="0"/>
-              <a:t>achelor in Computer Science and Engineering from RUET(ruet.ac.bd) and Master in Computer Science from Dalhousie University(dal.ca).</a:t>
+              <a:t>achelor in Computer Science and Engineering from RUET(ruet.ac.bd) and </a:t>
+            </a:r>
+            <a:r>
+              <a:rPr lang="en-CA" sz="2000" dirty="0" smtClean="0"/>
+              <a:t>Masters </a:t>
+            </a:r>
+            <a:r>
+              <a:rPr lang="en-CA" sz="2000" dirty="0" smtClean="0"/>
+              <a:t>in Computer Science from Dalhousie University(dal.ca).</a:t>
             </a:r>
             <a:br>
               <a:rPr lang="en-CA" sz="2000" dirty="0" smtClean="0"/>
@@ -4610,6 +4622,10 @@
             <a:r>
               <a:rPr lang="en-CA" sz="2000" dirty="0" smtClean="0"/>
               <a:t>, Typescript, </a:t>
+            </a:r>
+            <a:r>
+              <a:rPr lang="en-CA" sz="2000" dirty="0" smtClean="0"/>
+              <a:t>HTML5, CSS3, </a:t>
             </a:r>
             <a:r>
               <a:rPr lang="en-CA" sz="2000" dirty="0" err="1" smtClean="0"/>
@@ -4883,7 +4899,11 @@
           <a:p>
             <a:r>
               <a:rPr lang="en-CA" sz="2000" dirty="0" smtClean="0"/>
-              <a:t>Used to with agile methodology and its tools, multi-tasking, planning, estimation and management, quality assurance and compliance.</a:t>
+              <a:t>Use </a:t>
+            </a:r>
+            <a:r>
+              <a:rPr lang="en-CA" sz="2000" dirty="0" smtClean="0"/>
+              <a:t>to with agile methodology and its tools, multi-tasking, planning, estimation and management, quality assurance and compliance.</a:t>
             </a:r>
           </a:p>
           <a:p>
@@ -4996,7 +5016,11 @@
             </a:r>
             <a:r>
               <a:rPr lang="en-CA" sz="2000" dirty="0" smtClean="0"/>
-              <a:t>, etc.</a:t>
+              <a:t> Connect, </a:t>
+            </a:r>
+            <a:r>
+              <a:rPr lang="en-CA" sz="2000" dirty="0" smtClean="0"/>
+              <a:t>etc.</a:t>
             </a:r>
             <a:br>
               <a:rPr lang="en-CA" sz="2000" dirty="0" smtClean="0"/>
@@ -5006,7 +5030,19 @@
           <a:p>
             <a:r>
               <a:rPr lang="en-CA" sz="2000" dirty="0" smtClean="0"/>
-              <a:t>Strong ability in troubleshooting, debugging, patching, in documentation.</a:t>
+              <a:t>Strong ability in </a:t>
+            </a:r>
+            <a:r>
+              <a:rPr lang="en-CA" sz="2000" dirty="0" smtClean="0"/>
+              <a:t>feasibility study, </a:t>
+            </a:r>
+            <a:r>
+              <a:rPr lang="en-CA" sz="2000" dirty="0" smtClean="0"/>
+              <a:t>troubleshooting</a:t>
+            </a:r>
+            <a:r>
+              <a:rPr lang="en-CA" sz="2000" dirty="0" smtClean="0"/>
+              <a:t>, debugging, patching, in documentation.</a:t>
             </a:r>
             <a:br>
               <a:rPr lang="en-CA" sz="2000" dirty="0" smtClean="0"/>
@@ -5030,7 +5066,15 @@
             </a:r>
             <a:r>
               <a:rPr lang="en-CA" sz="2000" dirty="0" smtClean="0"/>
-              <a:t>xperience in legacy techs such as Oracle Forms/Reports and Struts.</a:t>
+              <a:t>xperience in legacy techs such as Oracle Forms/Reports and </a:t>
+            </a:r>
+            <a:r>
+              <a:rPr lang="en-CA" sz="2000" dirty="0" smtClean="0"/>
+              <a:t>Struts.</a:t>
+            </a:r>
+            <a:r>
+              <a:rPr lang="en-CA" sz="2000" dirty="0" smtClean="0"/>
+              <a:t/>
             </a:r>
             <a:br>
               <a:rPr lang="en-CA" sz="2000" dirty="0" smtClean="0"/>
@@ -5171,65 +5215,65 @@
         </p:spPr>
         <p:txBody>
           <a:bodyPr>
-            <a:normAutofit fontScale="77500" lnSpcReduction="20000"/>
+            <a:normAutofit/>
           </a:bodyPr>
           <a:lstStyle/>
           <a:p>
             <a:r>
-              <a:rPr lang="en-CA" dirty="0" smtClean="0"/>
+              <a:rPr lang="en-CA" sz="2000" dirty="0" smtClean="0"/>
               <a:t>Solid understanding of ORM, UI data binding, separation of concerns.</a:t>
             </a:r>
             <a:br>
-              <a:rPr lang="en-CA" dirty="0" smtClean="0"/>
+              <a:rPr lang="en-CA" sz="2000" dirty="0" smtClean="0"/>
             </a:br>
-            <a:endParaRPr lang="en-CA" dirty="0" smtClean="0"/>
-          </a:p>
-          <a:p>
-            <a:r>
-              <a:rPr lang="en-CA" dirty="0" smtClean="0"/>
+            <a:endParaRPr lang="en-CA" sz="2000" dirty="0" smtClean="0"/>
+          </a:p>
+          <a:p>
+            <a:r>
+              <a:rPr lang="en-CA" sz="2000" dirty="0" smtClean="0"/>
               <a:t>Extensive experience in bidirectional communication in web application using </a:t>
             </a:r>
             <a:r>
-              <a:rPr lang="en-CA" dirty="0" err="1" smtClean="0"/>
+              <a:rPr lang="en-CA" sz="2000" dirty="0" err="1" smtClean="0"/>
               <a:t>signalR</a:t>
             </a:r>
             <a:r>
-              <a:rPr lang="en-CA" dirty="0" smtClean="0"/>
+              <a:rPr lang="en-CA" sz="2000" dirty="0" smtClean="0"/>
               <a:t>/socket.io, horizontal scaling, pub/sub model.</a:t>
             </a:r>
             <a:br>
-              <a:rPr lang="en-CA" dirty="0" smtClean="0"/>
+              <a:rPr lang="en-CA" sz="2000" dirty="0" smtClean="0"/>
             </a:br>
-            <a:endParaRPr lang="en-CA" dirty="0" smtClean="0"/>
-          </a:p>
-          <a:p>
-            <a:r>
-              <a:rPr lang="en-CA" dirty="0" smtClean="0"/>
+            <a:endParaRPr lang="en-CA" sz="2000" dirty="0" smtClean="0"/>
+          </a:p>
+          <a:p>
+            <a:r>
+              <a:rPr lang="en-CA" sz="2000" dirty="0" smtClean="0"/>
               <a:t>I love to follow best practices and encourage team members to follow.</a:t>
             </a:r>
             <a:br>
-              <a:rPr lang="en-CA" dirty="0" smtClean="0"/>
+              <a:rPr lang="en-CA" sz="2000" dirty="0" smtClean="0"/>
             </a:br>
-            <a:endParaRPr lang="en-CA" dirty="0" smtClean="0"/>
-          </a:p>
-          <a:p>
-            <a:r>
-              <a:rPr lang="en-CA" dirty="0" smtClean="0"/>
+            <a:endParaRPr lang="en-CA" sz="2000" dirty="0" smtClean="0"/>
+          </a:p>
+          <a:p>
+            <a:r>
+              <a:rPr lang="en-CA" sz="2000" dirty="0" smtClean="0"/>
               <a:t>I’ve curiosity and enthusiasm to learn new technologies or do quick research to have solution and to make the job done. </a:t>
             </a:r>
             <a:br>
-              <a:rPr lang="en-CA" dirty="0" smtClean="0"/>
+              <a:rPr lang="en-CA" sz="2000" dirty="0" smtClean="0"/>
             </a:br>
-            <a:endParaRPr lang="en-CA" dirty="0" smtClean="0"/>
-          </a:p>
-          <a:p>
-            <a:r>
-              <a:rPr lang="en-CA" dirty="0" smtClean="0"/>
+            <a:endParaRPr lang="en-CA" sz="2000" dirty="0" smtClean="0"/>
+          </a:p>
+          <a:p>
+            <a:r>
+              <a:rPr lang="en-CA" sz="2000" dirty="0" smtClean="0"/>
               <a:t>Also, I’m eager to learn more on cyber-security and relevant security technologies and implement in projects.</a:t>
             </a:r>
           </a:p>
           <a:p>
-            <a:endParaRPr lang="en-US" dirty="0"/>
+            <a:endParaRPr lang="en-US" sz="2000" dirty="0"/>
           </a:p>
         </p:txBody>
       </p:sp>
@@ -5669,11 +5713,7 @@
           <a:p>
             <a:r>
               <a:rPr lang="en-CA" sz="3200" dirty="0" smtClean="0"/>
-              <a:t>System </a:t>
-            </a:r>
-            <a:r>
-              <a:rPr lang="en-CA" sz="3200" dirty="0" smtClean="0"/>
-              <a:t>Architecture (</a:t>
+              <a:t>System Architecture (</a:t>
             </a:r>
             <a:r>
               <a:rPr lang="en-CA" sz="3200" dirty="0" err="1" smtClean="0"/>
@@ -5713,7 +5753,7 @@
       </p:sp>
       <p:pic>
         <p:nvPicPr>
-          <p:cNvPr id="1027" name="Picture 3"/>
+          <p:cNvPr id="1026" name="Picture 2"/>
           <p:cNvPicPr>
             <a:picLocks noChangeAspect="1" noChangeArrowheads="1"/>
           </p:cNvPicPr>
@@ -5728,8 +5768,8 @@
         </p:blipFill>
         <p:spPr bwMode="auto">
           <a:xfrm>
-            <a:off x="1714480" y="1500174"/>
-            <a:ext cx="5581674" cy="4593767"/>
+            <a:off x="1928794" y="1571612"/>
+            <a:ext cx="5643602" cy="4644735"/>
           </a:xfrm>
           <a:prstGeom prst="rect">
             <a:avLst/>
@@ -5812,13 +5852,25 @@
         <p:spPr/>
         <p:txBody>
           <a:bodyPr>
-            <a:normAutofit fontScale="85000" lnSpcReduction="20000"/>
+            <a:normAutofit fontScale="70000" lnSpcReduction="20000"/>
           </a:bodyPr>
           <a:lstStyle/>
           <a:p>
             <a:r>
               <a:rPr lang="en-CA" dirty="0" smtClean="0"/>
-              <a:t>For development, I have used the IDE MS Visual Studio 2022.</a:t>
+              <a:t>I </a:t>
+            </a:r>
+            <a:r>
+              <a:rPr lang="en-CA" dirty="0" smtClean="0"/>
+              <a:t>have used the IDE MS Visual Studio </a:t>
+            </a:r>
+            <a:r>
+              <a:rPr lang="en-CA" dirty="0" smtClean="0"/>
+              <a:t>2022 for the development.</a:t>
+            </a:r>
+            <a:r>
+              <a:rPr lang="en-CA" dirty="0" smtClean="0"/>
+              <a:t/>
             </a:r>
             <a:br>
               <a:rPr lang="en-CA" dirty="0" smtClean="0"/>
@@ -5828,7 +5880,11 @@
           <a:p>
             <a:r>
               <a:rPr lang="en-CA" dirty="0" smtClean="0"/>
-              <a:t>Backend language: c# </a:t>
+              <a:t>Backend language: </a:t>
+            </a:r>
+            <a:r>
+              <a:rPr lang="en-CA" dirty="0" smtClean="0"/>
+              <a:t>C# </a:t>
             </a:r>
             <a:r>
               <a:rPr lang="en-CA" dirty="0" err="1" smtClean="0"/>
@@ -5846,7 +5902,27 @@
           <a:p>
             <a:r>
               <a:rPr lang="en-CA" dirty="0" smtClean="0"/>
-              <a:t>Frontend language: Typescript, React.js 18, Material UI.</a:t>
+              <a:t>Frontend language: </a:t>
+            </a:r>
+            <a:r>
+              <a:rPr lang="en-CA" dirty="0" err="1" smtClean="0"/>
+              <a:t>Javascript</a:t>
+            </a:r>
+            <a:r>
+              <a:rPr lang="en-CA" dirty="0" smtClean="0"/>
+              <a:t>/Typescript</a:t>
+            </a:r>
+            <a:r>
+              <a:rPr lang="en-CA" dirty="0" smtClean="0"/>
+              <a:t>, React.js 18, Material </a:t>
+            </a:r>
+            <a:r>
+              <a:rPr lang="en-CA" dirty="0" smtClean="0"/>
+              <a:t>UI, CSS3.</a:t>
+            </a:r>
+            <a:r>
+              <a:rPr lang="en-CA" dirty="0" smtClean="0"/>
+              <a:t/>
             </a:r>
             <a:br>
               <a:rPr lang="en-CA" dirty="0" smtClean="0"/>
@@ -5897,6 +5973,20 @@
             <a:r>
               <a:rPr lang="en-CA" dirty="0" err="1" smtClean="0"/>
               <a:t>Docker</a:t>
+            </a:r>
+            <a:endParaRPr lang="en-CA" dirty="0" smtClean="0"/>
+          </a:p>
+          <a:p>
+            <a:endParaRPr lang="en-CA" dirty="0" smtClean="0"/>
+          </a:p>
+          <a:p>
+            <a:r>
+              <a:rPr lang="en-CA" dirty="0" smtClean="0"/>
+              <a:t>Code repository: </a:t>
+            </a:r>
+            <a:r>
+              <a:rPr lang="en-CA" dirty="0" err="1" smtClean="0"/>
+              <a:t>github</a:t>
             </a:r>
             <a:endParaRPr lang="en-CA" dirty="0" smtClean="0"/>
           </a:p>
@@ -6006,8 +6096,8 @@
               <a:t>I have considered ‘Customer’ as a business entity that usually used in different organizations such NS health, Service NS, Bank, </a:t>
             </a:r>
             <a:r>
-              <a:rPr lang="en-CA" dirty="0" err="1" smtClean="0"/>
-              <a:t>Transunion</a:t>
+              <a:rPr lang="en-CA" dirty="0" smtClean="0"/>
+              <a:t>Trans-union</a:t>
             </a:r>
             <a:r>
               <a:rPr lang="en-CA" dirty="0" smtClean="0"/>
@@ -6021,7 +6111,15 @@
           <a:p>
             <a:r>
               <a:rPr lang="en-CA" dirty="0" smtClean="0"/>
-              <a:t>To open an account in those organizations, they used to ask for additional information such as driving license, utility bills, passport, PR card, etc.</a:t>
+              <a:t>To open an account in those organizations, they used to ask for additional information such as driving license, utility bills, passport, PR card, </a:t>
+            </a:r>
+            <a:r>
+              <a:rPr lang="en-CA" dirty="0" smtClean="0"/>
+              <a:t>etc for validation and activate the account.</a:t>
+            </a:r>
+            <a:r>
+              <a:rPr lang="en-CA" dirty="0" smtClean="0"/>
+              <a:t/>
             </a:r>
             <a:br>
               <a:rPr lang="en-CA" dirty="0" smtClean="0"/>
@@ -6031,7 +6129,15 @@
           <a:p>
             <a:r>
               <a:rPr lang="en-CA" dirty="0" smtClean="0"/>
-              <a:t>Here every information is considered as a ‘Document’  and this is child entity associated with the parent entity ‘Customer’.</a:t>
+              <a:t>Here every information is considered as a ‘Document’  and this is child entity </a:t>
+            </a:r>
+            <a:r>
+              <a:rPr lang="en-CA" dirty="0" smtClean="0"/>
+              <a:t>is associated </a:t>
+            </a:r>
+            <a:r>
+              <a:rPr lang="en-CA" dirty="0" smtClean="0"/>
+              <a:t>with the parent entity ‘Customer’.</a:t>
             </a:r>
             <a:br>
               <a:rPr lang="en-CA" dirty="0" smtClean="0"/>
@@ -6041,7 +6147,15 @@
           <a:p>
             <a:r>
               <a:rPr lang="en-CA" dirty="0" smtClean="0"/>
-              <a:t>At first admin needs to create a customer with the required information. Then in terms of activation they will upload the required documents.</a:t>
+              <a:t>At first admin needs to create a customer with the required information. Then in terms of </a:t>
+            </a:r>
+            <a:r>
+              <a:rPr lang="en-CA" dirty="0" smtClean="0"/>
+              <a:t>activation, </a:t>
+            </a:r>
+            <a:r>
+              <a:rPr lang="en-CA" dirty="0" smtClean="0"/>
+              <a:t>they will upload the required documents.</a:t>
             </a:r>
             <a:br>
               <a:rPr lang="en-CA" dirty="0" smtClean="0"/>
@@ -6051,7 +6165,15 @@
           <a:p>
             <a:r>
               <a:rPr lang="en-CA" dirty="0" smtClean="0"/>
-              <a:t>When all documents are uploaded, the admin staff can verify it and activate the account. (validation and activation are out of scope of the project).</a:t>
+              <a:t>When all documents are uploaded, the admin staff can verify it and activate the account. (validation and </a:t>
+            </a:r>
+            <a:r>
+              <a:rPr lang="en-CA" dirty="0" smtClean="0"/>
+              <a:t>activation parts </a:t>
+            </a:r>
+            <a:r>
+              <a:rPr lang="en-CA" dirty="0" smtClean="0"/>
+              <a:t>are out of scope of the project).</a:t>
             </a:r>
           </a:p>
         </p:txBody>

</xml_diff>

<commit_message>
Minor update in the slide
</commit_message>
<xml_diff>
--- a/Presentation.pptx
+++ b/Presentation.pptx
@@ -5,7 +5,7 @@
     <p:sldMasterId id="2147483648" r:id="rId1"/>
   </p:sldMasterIdLst>
   <p:notesMasterIdLst>
-    <p:notesMasterId r:id="rId18"/>
+    <p:notesMasterId r:id="rId19"/>
   </p:notesMasterIdLst>
   <p:sldIdLst>
     <p:sldId id="256" r:id="rId2"/>
@@ -22,8 +22,9 @@
     <p:sldId id="267" r:id="rId13"/>
     <p:sldId id="268" r:id="rId14"/>
     <p:sldId id="269" r:id="rId15"/>
-    <p:sldId id="270" r:id="rId16"/>
-    <p:sldId id="271" r:id="rId17"/>
+    <p:sldId id="272" r:id="rId16"/>
+    <p:sldId id="270" r:id="rId17"/>
+    <p:sldId id="271" r:id="rId18"/>
   </p:sldIdLst>
   <p:sldSz cx="9144000" cy="6858000" type="screen4x3"/>
   <p:notesSz cx="6858000" cy="9144000"/>
@@ -3477,10 +3478,6 @@
               <a:rPr lang="en-US" dirty="0" smtClean="0"/>
               <a:t>Document Management System</a:t>
             </a:r>
-            <a:r>
-              <a:rPr lang="en-US" dirty="0" smtClean="0"/>
-              <a:t/>
-            </a:r>
             <a:br>
               <a:rPr lang="en-US" dirty="0" smtClean="0"/>
             </a:br>
@@ -4370,7 +4367,7 @@
           <a:p>
             <a:r>
               <a:rPr lang="en-CA" dirty="0" smtClean="0"/>
-              <a:t>Follow up questions?</a:t>
+              <a:t>API Security</a:t>
             </a:r>
             <a:endParaRPr lang="en-US" dirty="0"/>
           </a:p>
@@ -4388,16 +4385,205 @@
         </p:nvSpPr>
         <p:spPr/>
         <p:txBody>
-          <a:bodyPr/>
-          <a:lstStyle/>
-          <a:p>
-            <a:endParaRPr lang="en-CA" dirty="0" smtClean="0"/>
-          </a:p>
-          <a:p>
-            <a:endParaRPr lang="en-CA" dirty="0"/>
-          </a:p>
-          <a:p>
-            <a:endParaRPr lang="en-CA" dirty="0" smtClean="0"/>
+          <a:bodyPr>
+            <a:normAutofit fontScale="70000" lnSpcReduction="20000"/>
+          </a:bodyPr>
+          <a:lstStyle/>
+          <a:p>
+            <a:r>
+              <a:rPr lang="en-US" b="1" dirty="0" err="1" smtClean="0"/>
+              <a:t>Sql</a:t>
+            </a:r>
+            <a:r>
+              <a:rPr lang="en-US" b="1" dirty="0" smtClean="0"/>
+              <a:t>-Injection</a:t>
+            </a:r>
+            <a:r>
+              <a:rPr lang="en-US" dirty="0" smtClean="0"/>
+              <a:t>:</a:t>
+            </a:r>
+          </a:p>
+          <a:p>
+            <a:pPr lvl="1">
+              <a:buFont typeface="Wingdings" pitchFamily="2" charset="2"/>
+              <a:buChar char="Ø"/>
+            </a:pPr>
+            <a:r>
+              <a:rPr lang="en-US" dirty="0" smtClean="0"/>
+              <a:t>Since </a:t>
+            </a:r>
+            <a:r>
+              <a:rPr lang="en-US" dirty="0" smtClean="0"/>
+              <a:t>c# is fully typed language and we are using </a:t>
+            </a:r>
+            <a:r>
+              <a:rPr lang="en-US" dirty="0" err="1" smtClean="0"/>
+              <a:t>.net</a:t>
+            </a:r>
+            <a:r>
+              <a:rPr lang="en-US" dirty="0" smtClean="0"/>
+              <a:t> core 8, everything is object but no raw </a:t>
+            </a:r>
+            <a:r>
+              <a:rPr lang="en-US" dirty="0" smtClean="0"/>
+              <a:t>query.</a:t>
+            </a:r>
+          </a:p>
+          <a:p>
+            <a:pPr lvl="1">
+              <a:buFont typeface="Wingdings" pitchFamily="2" charset="2"/>
+              <a:buChar char="Ø"/>
+            </a:pPr>
+            <a:r>
+              <a:rPr lang="en-US" dirty="0" smtClean="0"/>
+              <a:t>In </a:t>
+            </a:r>
+            <a:r>
+              <a:rPr lang="en-US" dirty="0" smtClean="0"/>
+              <a:t>LINQ all queries are parameter driven, so no string interpolation and no chances to </a:t>
+            </a:r>
+            <a:r>
+              <a:rPr lang="en-US" dirty="0" smtClean="0"/>
+              <a:t>trespass.</a:t>
+            </a:r>
+          </a:p>
+          <a:p>
+            <a:pPr lvl="1">
+              <a:buFont typeface="Wingdings" pitchFamily="2" charset="2"/>
+              <a:buChar char="Ø"/>
+            </a:pPr>
+            <a:r>
+              <a:rPr lang="en-US" dirty="0" smtClean="0"/>
+              <a:t>Framework </a:t>
+            </a:r>
+            <a:r>
+              <a:rPr lang="en-US" dirty="0" smtClean="0"/>
+              <a:t>construct blocks </a:t>
+            </a:r>
+            <a:r>
+              <a:rPr lang="en-US" dirty="0" smtClean="0"/>
+              <a:t>malicious </a:t>
+            </a:r>
+            <a:r>
+              <a:rPr lang="en-US" dirty="0" smtClean="0"/>
+              <a:t>data by type checking. For example: </a:t>
+            </a:r>
+            <a:r>
+              <a:rPr lang="en-US" dirty="0" err="1" smtClean="0"/>
+              <a:t>Guid</a:t>
+            </a:r>
+            <a:r>
+              <a:rPr lang="en-US" dirty="0" smtClean="0"/>
+              <a:t>.</a:t>
+            </a:r>
+            <a:endParaRPr lang="en-US" dirty="0" smtClean="0"/>
+          </a:p>
+          <a:p>
+            <a:endParaRPr lang="en-US" dirty="0" smtClean="0"/>
+          </a:p>
+          <a:p>
+            <a:r>
+              <a:rPr lang="en-US" b="1" dirty="0" smtClean="0"/>
+              <a:t>XSS</a:t>
+            </a:r>
+            <a:r>
+              <a:rPr lang="en-US" dirty="0" smtClean="0"/>
+              <a:t>:</a:t>
+            </a:r>
+          </a:p>
+          <a:p>
+            <a:pPr lvl="1">
+              <a:buFont typeface="Wingdings" pitchFamily="2" charset="2"/>
+              <a:buChar char="Ø"/>
+            </a:pPr>
+            <a:r>
+              <a:rPr lang="en-US" dirty="0" smtClean="0"/>
+              <a:t>Added a middleware that sanitizes the inputs in the server</a:t>
+            </a:r>
+            <a:r>
+              <a:rPr lang="en-US" dirty="0" smtClean="0"/>
+              <a:t>.</a:t>
+            </a:r>
+            <a:endParaRPr lang="en-US" dirty="0" smtClean="0"/>
+          </a:p>
+          <a:p>
+            <a:pPr lvl="1">
+              <a:buFont typeface="Wingdings" pitchFamily="2" charset="2"/>
+              <a:buChar char="Ø"/>
+            </a:pPr>
+            <a:r>
+              <a:rPr lang="en-US" dirty="0" smtClean="0"/>
+              <a:t>Avoided script injection by </a:t>
+            </a:r>
+            <a:r>
+              <a:rPr lang="en-US" dirty="0" err="1" smtClean="0"/>
+              <a:t>innerHTML</a:t>
+            </a:r>
+            <a:r>
+              <a:rPr lang="en-US" dirty="0" smtClean="0"/>
+              <a:t>, instead we made parameter based tags dynamically for example in </a:t>
+            </a:r>
+            <a:r>
+              <a:rPr lang="en-US" dirty="0" err="1" smtClean="0"/>
+              <a:t>DocumentViewer</a:t>
+            </a:r>
+            <a:r>
+              <a:rPr lang="en-US" dirty="0" smtClean="0"/>
+              <a:t>.</a:t>
+            </a:r>
+            <a:endParaRPr lang="en-US" dirty="0" smtClean="0"/>
+          </a:p>
+          <a:p>
+            <a:endParaRPr lang="en-US" dirty="0" smtClean="0"/>
+          </a:p>
+          <a:p>
+            <a:r>
+              <a:rPr lang="en-US" b="1" dirty="0" smtClean="0"/>
+              <a:t>CSP(Content Security Policy</a:t>
+            </a:r>
+            <a:r>
+              <a:rPr lang="en-US" b="1" dirty="0" smtClean="0"/>
+              <a:t>)</a:t>
+            </a:r>
+            <a:r>
+              <a:rPr lang="en-US" dirty="0" smtClean="0"/>
+              <a:t>:</a:t>
+            </a:r>
+            <a:endParaRPr lang="en-US" dirty="0" smtClean="0"/>
+          </a:p>
+          <a:p>
+            <a:pPr lvl="1">
+              <a:buFont typeface="Wingdings" pitchFamily="2" charset="2"/>
+              <a:buChar char="Ø"/>
+            </a:pPr>
+            <a:r>
+              <a:rPr lang="en-US" dirty="0" smtClean="0"/>
+              <a:t>Implemented by adding CSP </a:t>
+            </a:r>
+            <a:r>
+              <a:rPr lang="en-US" dirty="0" smtClean="0"/>
+              <a:t>header to the </a:t>
+            </a:r>
+            <a:r>
+              <a:rPr lang="en-US" dirty="0" smtClean="0"/>
+              <a:t>response</a:t>
+            </a:r>
+            <a:r>
+              <a:rPr lang="en-US" dirty="0" smtClean="0"/>
+              <a:t> </a:t>
+            </a:r>
+            <a:r>
+              <a:rPr lang="en-US" dirty="0" smtClean="0"/>
+              <a:t>in startup.</a:t>
+            </a:r>
+            <a:endParaRPr lang="en-US" dirty="0" smtClean="0"/>
+          </a:p>
+          <a:p>
+            <a:pPr lvl="1">
+              <a:buFont typeface="Wingdings" pitchFamily="2" charset="2"/>
+              <a:buChar char="Ø"/>
+            </a:pPr>
+            <a:endParaRPr lang="en-US" dirty="0" smtClean="0"/>
           </a:p>
           <a:p>
             <a:endParaRPr lang="en-US" dirty="0"/>
@@ -4433,13 +4619,6 @@
   <p:clrMapOvr>
     <a:masterClrMapping/>
   </p:clrMapOvr>
-  <p:timing>
-    <p:tnLst>
-      <p:par>
-        <p:cTn id="1" dur="indefinite" restart="never" nodeType="tmRoot"/>
-      </p:par>
-    </p:tnLst>
-  </p:timing>
 </p:sld>
 </file>
 
@@ -4470,6 +4649,113 @@
             <p:ph type="title"/>
           </p:nvPr>
         </p:nvSpPr>
+        <p:spPr/>
+        <p:txBody>
+          <a:bodyPr/>
+          <a:lstStyle/>
+          <a:p>
+            <a:r>
+              <a:rPr lang="en-CA" dirty="0" smtClean="0"/>
+              <a:t>Follow up questions?</a:t>
+            </a:r>
+            <a:endParaRPr lang="en-US" dirty="0"/>
+          </a:p>
+        </p:txBody>
+      </p:sp>
+      <p:sp>
+        <p:nvSpPr>
+          <p:cNvPr id="3" name="Content Placeholder 2"/>
+          <p:cNvSpPr>
+            <a:spLocks noGrp="1"/>
+          </p:cNvSpPr>
+          <p:nvPr>
+            <p:ph idx="1"/>
+          </p:nvPr>
+        </p:nvSpPr>
+        <p:spPr/>
+        <p:txBody>
+          <a:bodyPr/>
+          <a:lstStyle/>
+          <a:p>
+            <a:endParaRPr lang="en-CA" dirty="0" smtClean="0"/>
+          </a:p>
+          <a:p>
+            <a:endParaRPr lang="en-CA" dirty="0"/>
+          </a:p>
+          <a:p>
+            <a:endParaRPr lang="en-CA" dirty="0" smtClean="0"/>
+          </a:p>
+          <a:p>
+            <a:endParaRPr lang="en-US" dirty="0"/>
+          </a:p>
+        </p:txBody>
+      </p:sp>
+      <p:sp>
+        <p:nvSpPr>
+          <p:cNvPr id="4" name="Slide Number Placeholder 3"/>
+          <p:cNvSpPr>
+            <a:spLocks noGrp="1"/>
+          </p:cNvSpPr>
+          <p:nvPr>
+            <p:ph type="sldNum" sz="quarter" idx="12"/>
+          </p:nvPr>
+        </p:nvSpPr>
+        <p:spPr/>
+        <p:txBody>
+          <a:bodyPr/>
+          <a:lstStyle/>
+          <a:p>
+            <a:fld id="{4269F878-3F52-4AB8-B97F-8D994BB68F4C}" type="slidenum">
+              <a:rPr lang="en-US" smtClean="0"/>
+              <a:pPr/>
+              <a:t>16</a:t>
+            </a:fld>
+            <a:endParaRPr lang="en-US"/>
+          </a:p>
+        </p:txBody>
+      </p:sp>
+    </p:spTree>
+  </p:cSld>
+  <p:clrMapOvr>
+    <a:masterClrMapping/>
+  </p:clrMapOvr>
+  <p:timing>
+    <p:tnLst>
+      <p:par>
+        <p:cTn id="1" dur="indefinite" restart="never" nodeType="tmRoot"/>
+      </p:par>
+    </p:tnLst>
+  </p:timing>
+</p:sld>
+</file>
+
+<file path=ppt/slides/slide17.xml><?xml version="1.0" encoding="utf-8"?>
+<p:sld xmlns:a="http://schemas.openxmlformats.org/drawingml/2006/main" xmlns:r="http://schemas.openxmlformats.org/officeDocument/2006/relationships" xmlns:p="http://schemas.openxmlformats.org/presentationml/2006/main">
+  <p:cSld>
+    <p:spTree>
+      <p:nvGrpSpPr>
+        <p:cNvPr id="1" name=""/>
+        <p:cNvGrpSpPr/>
+        <p:nvPr/>
+      </p:nvGrpSpPr>
+      <p:grpSpPr>
+        <a:xfrm>
+          <a:off x="0" y="0"/>
+          <a:ext cx="0" cy="0"/>
+          <a:chOff x="0" y="0"/>
+          <a:chExt cx="0" cy="0"/>
+        </a:xfrm>
+      </p:grpSpPr>
+      <p:sp>
+        <p:nvSpPr>
+          <p:cNvPr id="2" name="Title 1"/>
+          <p:cNvSpPr>
+            <a:spLocks noGrp="1"/>
+          </p:cNvSpPr>
+          <p:nvPr>
+            <p:ph type="title"/>
+          </p:nvPr>
+        </p:nvSpPr>
         <p:spPr>
           <a:xfrm>
             <a:off x="428596" y="2643182"/>
@@ -4506,7 +4792,7 @@
             <a:fld id="{4269F878-3F52-4AB8-B97F-8D994BB68F4C}" type="slidenum">
               <a:rPr lang="en-US" smtClean="0"/>
               <a:pPr/>
-              <a:t>16</a:t>
+              <a:t>17</a:t>
             </a:fld>
             <a:endParaRPr lang="en-US"/>
           </a:p>
@@ -4595,15 +4881,7 @@
             </a:r>
             <a:r>
               <a:rPr lang="en-CA" sz="2000" dirty="0" smtClean="0"/>
-              <a:t>achelor in Computer Science and Engineering from RUET(ruet.ac.bd) and </a:t>
-            </a:r>
-            <a:r>
-              <a:rPr lang="en-CA" sz="2000" dirty="0" smtClean="0"/>
-              <a:t>Masters </a:t>
-            </a:r>
-            <a:r>
-              <a:rPr lang="en-CA" sz="2000" dirty="0" smtClean="0"/>
-              <a:t>in Computer Science from Dalhousie University(dal.ca).</a:t>
+              <a:t>achelor in Computer Science and Engineering from RUET(ruet.ac.bd) and Masters in Computer Science from Dalhousie University(dal.ca).</a:t>
             </a:r>
             <a:br>
               <a:rPr lang="en-CA" sz="2000" dirty="0" smtClean="0"/>
@@ -4621,11 +4899,7 @@
             </a:r>
             <a:r>
               <a:rPr lang="en-CA" sz="2000" dirty="0" smtClean="0"/>
-              <a:t>, Typescript, </a:t>
-            </a:r>
-            <a:r>
-              <a:rPr lang="en-CA" sz="2000" dirty="0" smtClean="0"/>
-              <a:t>HTML5, CSS3, </a:t>
+              <a:t>, Typescript, HTML5, CSS3, </a:t>
             </a:r>
             <a:r>
               <a:rPr lang="en-CA" sz="2000" dirty="0" err="1" smtClean="0"/>
@@ -4899,11 +5173,7 @@
           <a:p>
             <a:r>
               <a:rPr lang="en-CA" sz="2000" dirty="0" smtClean="0"/>
-              <a:t>Use </a:t>
-            </a:r>
-            <a:r>
-              <a:rPr lang="en-CA" sz="2000" dirty="0" smtClean="0"/>
-              <a:t>to with agile methodology and its tools, multi-tasking, planning, estimation and management, quality assurance and compliance.</a:t>
+              <a:t>Use to with agile methodology and its tools, multi-tasking, planning, estimation and management, quality assurance and compliance.</a:t>
             </a:r>
           </a:p>
           <a:p>
@@ -5016,11 +5286,7 @@
             </a:r>
             <a:r>
               <a:rPr lang="en-CA" sz="2000" dirty="0" smtClean="0"/>
-              <a:t> Connect, </a:t>
-            </a:r>
-            <a:r>
-              <a:rPr lang="en-CA" sz="2000" dirty="0" smtClean="0"/>
-              <a:t>etc.</a:t>
+              <a:t> Connect, etc.</a:t>
             </a:r>
             <a:br>
               <a:rPr lang="en-CA" sz="2000" dirty="0" smtClean="0"/>
@@ -5030,19 +5296,7 @@
           <a:p>
             <a:r>
               <a:rPr lang="en-CA" sz="2000" dirty="0" smtClean="0"/>
-              <a:t>Strong ability in </a:t>
-            </a:r>
-            <a:r>
-              <a:rPr lang="en-CA" sz="2000" dirty="0" smtClean="0"/>
-              <a:t>feasibility study, </a:t>
-            </a:r>
-            <a:r>
-              <a:rPr lang="en-CA" sz="2000" dirty="0" smtClean="0"/>
-              <a:t>troubleshooting</a:t>
-            </a:r>
-            <a:r>
-              <a:rPr lang="en-CA" sz="2000" dirty="0" smtClean="0"/>
-              <a:t>, debugging, patching, in documentation.</a:t>
+              <a:t>Strong ability in feasibility study, troubleshooting, debugging, patching, in documentation.</a:t>
             </a:r>
             <a:br>
               <a:rPr lang="en-CA" sz="2000" dirty="0" smtClean="0"/>
@@ -5066,15 +5320,7 @@
             </a:r>
             <a:r>
               <a:rPr lang="en-CA" sz="2000" dirty="0" smtClean="0"/>
-              <a:t>xperience in legacy techs such as Oracle Forms/Reports and </a:t>
-            </a:r>
-            <a:r>
-              <a:rPr lang="en-CA" sz="2000" dirty="0" smtClean="0"/>
-              <a:t>Struts.</a:t>
-            </a:r>
-            <a:r>
-              <a:rPr lang="en-CA" sz="2000" dirty="0" smtClean="0"/>
-              <a:t/>
+              <a:t>xperience in legacy techs such as Oracle Forms/Reports and Struts.</a:t>
             </a:r>
             <a:br>
               <a:rPr lang="en-CA" sz="2000" dirty="0" smtClean="0"/>
@@ -5858,19 +6104,7 @@
           <a:p>
             <a:r>
               <a:rPr lang="en-CA" dirty="0" smtClean="0"/>
-              <a:t>I </a:t>
-            </a:r>
-            <a:r>
-              <a:rPr lang="en-CA" dirty="0" smtClean="0"/>
-              <a:t>have used the IDE MS Visual Studio </a:t>
-            </a:r>
-            <a:r>
-              <a:rPr lang="en-CA" dirty="0" smtClean="0"/>
-              <a:t>2022 for the development.</a:t>
-            </a:r>
-            <a:r>
-              <a:rPr lang="en-CA" dirty="0" smtClean="0"/>
-              <a:t/>
+              <a:t>I have used the IDE MS Visual Studio 2022 for the development.</a:t>
             </a:r>
             <a:br>
               <a:rPr lang="en-CA" dirty="0" smtClean="0"/>
@@ -5880,11 +6114,7 @@
           <a:p>
             <a:r>
               <a:rPr lang="en-CA" dirty="0" smtClean="0"/>
-              <a:t>Backend language: </a:t>
-            </a:r>
-            <a:r>
-              <a:rPr lang="en-CA" dirty="0" smtClean="0"/>
-              <a:t>C# </a:t>
+              <a:t>Backend language: C# </a:t>
             </a:r>
             <a:r>
               <a:rPr lang="en-CA" dirty="0" err="1" smtClean="0"/>
@@ -5910,19 +6140,7 @@
             </a:r>
             <a:r>
               <a:rPr lang="en-CA" dirty="0" smtClean="0"/>
-              <a:t>/Typescript</a:t>
-            </a:r>
-            <a:r>
-              <a:rPr lang="en-CA" dirty="0" smtClean="0"/>
-              <a:t>, React.js 18, Material </a:t>
-            </a:r>
-            <a:r>
-              <a:rPr lang="en-CA" dirty="0" smtClean="0"/>
-              <a:t>UI, CSS3.</a:t>
-            </a:r>
-            <a:r>
-              <a:rPr lang="en-CA" dirty="0" smtClean="0"/>
-              <a:t/>
+              <a:t>/Typescript, React.js 18, Material UI, CSS3.</a:t>
             </a:r>
             <a:br>
               <a:rPr lang="en-CA" dirty="0" smtClean="0"/>
@@ -6093,15 +6311,7 @@
           <a:p>
             <a:r>
               <a:rPr lang="en-CA" dirty="0" smtClean="0"/>
-              <a:t>I have considered ‘Customer’ as a business entity that usually used in different organizations such NS health, Service NS, Bank, </a:t>
-            </a:r>
-            <a:r>
-              <a:rPr lang="en-CA" dirty="0" smtClean="0"/>
-              <a:t>Trans-union</a:t>
-            </a:r>
-            <a:r>
-              <a:rPr lang="en-CA" dirty="0" smtClean="0"/>
-              <a:t>, Mobile operators, etc.</a:t>
+              <a:t>I have considered ‘Customer’ as a business entity that usually used in different organizations such NS health, Service NS, Bank, Trans-union, Mobile operators, etc.</a:t>
             </a:r>
             <a:br>
               <a:rPr lang="en-CA" dirty="0" smtClean="0"/>
@@ -6111,15 +6321,7 @@
           <a:p>
             <a:r>
               <a:rPr lang="en-CA" dirty="0" smtClean="0"/>
-              <a:t>To open an account in those organizations, they used to ask for additional information such as driving license, utility bills, passport, PR card, </a:t>
-            </a:r>
-            <a:r>
-              <a:rPr lang="en-CA" dirty="0" smtClean="0"/>
-              <a:t>etc for validation and activate the account.</a:t>
-            </a:r>
-            <a:r>
-              <a:rPr lang="en-CA" dirty="0" smtClean="0"/>
-              <a:t/>
+              <a:t>To open an account in those organizations, they used to ask for additional information such as driving license, utility bills, passport, PR card, etc for validation and activate the account.</a:t>
             </a:r>
             <a:br>
               <a:rPr lang="en-CA" dirty="0" smtClean="0"/>
@@ -6129,15 +6331,7 @@
           <a:p>
             <a:r>
               <a:rPr lang="en-CA" dirty="0" smtClean="0"/>
-              <a:t>Here every information is considered as a ‘Document’  and this is child entity </a:t>
-            </a:r>
-            <a:r>
-              <a:rPr lang="en-CA" dirty="0" smtClean="0"/>
-              <a:t>is associated </a:t>
-            </a:r>
-            <a:r>
-              <a:rPr lang="en-CA" dirty="0" smtClean="0"/>
-              <a:t>with the parent entity ‘Customer’.</a:t>
+              <a:t>Here every information is considered as a ‘Document’  and this is child entity is associated with the parent entity ‘Customer’.</a:t>
             </a:r>
             <a:br>
               <a:rPr lang="en-CA" dirty="0" smtClean="0"/>
@@ -6147,15 +6341,7 @@
           <a:p>
             <a:r>
               <a:rPr lang="en-CA" dirty="0" smtClean="0"/>
-              <a:t>At first admin needs to create a customer with the required information. Then in terms of </a:t>
-            </a:r>
-            <a:r>
-              <a:rPr lang="en-CA" dirty="0" smtClean="0"/>
-              <a:t>activation, </a:t>
-            </a:r>
-            <a:r>
-              <a:rPr lang="en-CA" dirty="0" smtClean="0"/>
-              <a:t>they will upload the required documents.</a:t>
+              <a:t>At first admin needs to create a customer with the required information. Then in terms of activation, they will upload the required documents.</a:t>
             </a:r>
             <a:br>
               <a:rPr lang="en-CA" dirty="0" smtClean="0"/>
@@ -6165,15 +6351,7 @@
           <a:p>
             <a:r>
               <a:rPr lang="en-CA" dirty="0" smtClean="0"/>
-              <a:t>When all documents are uploaded, the admin staff can verify it and activate the account. (validation and </a:t>
-            </a:r>
-            <a:r>
-              <a:rPr lang="en-CA" dirty="0" smtClean="0"/>
-              <a:t>activation parts </a:t>
-            </a:r>
-            <a:r>
-              <a:rPr lang="en-CA" dirty="0" smtClean="0"/>
-              <a:t>are out of scope of the project).</a:t>
+              <a:t>When all documents are uploaded, the admin staff can verify it and activate the account. (validation and activation parts are out of scope of the project).</a:t>
             </a:r>
           </a:p>
         </p:txBody>

</xml_diff>